<commit_message>
added Mitch edit of L1.2
</commit_message>
<xml_diff>
--- a/Slides/Lesson 1.1 Course Introduction.pptx
+++ b/Slides/Lesson 1.1 Course Introduction.pptx
@@ -134,6 +134,110 @@
     </p:ext>
   </p:extLst>
 </p:presentation>
+</file>
+
+<file path=ppt/changesInfos/changesInfo1.xml><?xml version="1.0" encoding="utf-8"?>
+<pc:chgInfo xmlns:a="http://schemas.openxmlformats.org/drawingml/2006/main" xmlns:r="http://schemas.openxmlformats.org/officeDocument/2006/relationships" xmlns:ac="http://schemas.microsoft.com/office/drawing/2013/main/command" xmlns:pc="http://schemas.microsoft.com/office/powerpoint/2013/main/command">
+  <pc:docChgLst>
+    <pc:chgData name="Mitchell Wand" userId="de9b44c55c049659" providerId="LiveId" clId="{D5DCE915-3EA3-44C5-B0FC-5B0576900331}"/>
+    <pc:docChg chg="custSel modSld">
+      <pc:chgData name="Mitchell Wand" userId="de9b44c55c049659" providerId="LiveId" clId="{D5DCE915-3EA3-44C5-B0FC-5B0576900331}" dt="2022-08-31T02:06:38.518" v="267" actId="20577"/>
+      <pc:docMkLst>
+        <pc:docMk/>
+      </pc:docMkLst>
+      <pc:sldChg chg="modSp mod">
+        <pc:chgData name="Mitchell Wand" userId="de9b44c55c049659" providerId="LiveId" clId="{D5DCE915-3EA3-44C5-B0FC-5B0576900331}" dt="2022-08-31T01:58:28.114" v="205" actId="20577"/>
+        <pc:sldMkLst>
+          <pc:docMk/>
+          <pc:sldMk cId="0" sldId="279"/>
+        </pc:sldMkLst>
+        <pc:spChg chg="mod">
+          <ac:chgData name="Mitchell Wand" userId="de9b44c55c049659" providerId="LiveId" clId="{D5DCE915-3EA3-44C5-B0FC-5B0576900331}" dt="2022-08-31T01:58:28.114" v="205" actId="20577"/>
+          <ac:spMkLst>
+            <pc:docMk/>
+            <pc:sldMk cId="0" sldId="279"/>
+            <ac:spMk id="254" creationId="{00000000-0000-0000-0000-000000000000}"/>
+          </ac:spMkLst>
+        </pc:spChg>
+      </pc:sldChg>
+      <pc:sldChg chg="modSp mod">
+        <pc:chgData name="Mitchell Wand" userId="de9b44c55c049659" providerId="LiveId" clId="{D5DCE915-3EA3-44C5-B0FC-5B0576900331}" dt="2022-08-31T02:00:53.565" v="262" actId="20577"/>
+        <pc:sldMkLst>
+          <pc:docMk/>
+          <pc:sldMk cId="0" sldId="280"/>
+        </pc:sldMkLst>
+        <pc:spChg chg="mod">
+          <ac:chgData name="Mitchell Wand" userId="de9b44c55c049659" providerId="LiveId" clId="{D5DCE915-3EA3-44C5-B0FC-5B0576900331}" dt="2022-08-31T02:00:53.565" v="262" actId="20577"/>
+          <ac:spMkLst>
+            <pc:docMk/>
+            <pc:sldMk cId="0" sldId="280"/>
+            <ac:spMk id="258" creationId="{00000000-0000-0000-0000-000000000000}"/>
+          </ac:spMkLst>
+        </pc:spChg>
+      </pc:sldChg>
+      <pc:sldChg chg="modSp mod">
+        <pc:chgData name="Mitchell Wand" userId="de9b44c55c049659" providerId="LiveId" clId="{D5DCE915-3EA3-44C5-B0FC-5B0576900331}" dt="2022-08-31T01:57:24.054" v="137" actId="20577"/>
+        <pc:sldMkLst>
+          <pc:docMk/>
+          <pc:sldMk cId="3191866407" sldId="299"/>
+        </pc:sldMkLst>
+        <pc:spChg chg="mod">
+          <ac:chgData name="Mitchell Wand" userId="de9b44c55c049659" providerId="LiveId" clId="{D5DCE915-3EA3-44C5-B0FC-5B0576900331}" dt="2022-08-31T01:57:24.054" v="137" actId="20577"/>
+          <ac:spMkLst>
+            <pc:docMk/>
+            <pc:sldMk cId="3191866407" sldId="299"/>
+            <ac:spMk id="3" creationId="{3B13C7A6-A28D-4387-9F64-48979188D9B1}"/>
+          </ac:spMkLst>
+        </pc:spChg>
+      </pc:sldChg>
+      <pc:sldChg chg="modSp mod">
+        <pc:chgData name="Mitchell Wand" userId="de9b44c55c049659" providerId="LiveId" clId="{D5DCE915-3EA3-44C5-B0FC-5B0576900331}" dt="2022-08-31T01:55:49.701" v="64" actId="27636"/>
+        <pc:sldMkLst>
+          <pc:docMk/>
+          <pc:sldMk cId="1165156964" sldId="300"/>
+        </pc:sldMkLst>
+        <pc:spChg chg="mod">
+          <ac:chgData name="Mitchell Wand" userId="de9b44c55c049659" providerId="LiveId" clId="{D5DCE915-3EA3-44C5-B0FC-5B0576900331}" dt="2022-08-31T01:55:49.701" v="64" actId="27636"/>
+          <ac:spMkLst>
+            <pc:docMk/>
+            <pc:sldMk cId="1165156964" sldId="300"/>
+            <ac:spMk id="3" creationId="{2F14D664-92BF-4A0F-A0F9-34716F35F125}"/>
+          </ac:spMkLst>
+        </pc:spChg>
+      </pc:sldChg>
+      <pc:sldChg chg="modSp mod">
+        <pc:chgData name="Mitchell Wand" userId="de9b44c55c049659" providerId="LiveId" clId="{D5DCE915-3EA3-44C5-B0FC-5B0576900331}" dt="2022-08-31T01:55:05.279" v="55" actId="114"/>
+        <pc:sldMkLst>
+          <pc:docMk/>
+          <pc:sldMk cId="504651817" sldId="308"/>
+        </pc:sldMkLst>
+        <pc:spChg chg="mod">
+          <ac:chgData name="Mitchell Wand" userId="de9b44c55c049659" providerId="LiveId" clId="{D5DCE915-3EA3-44C5-B0FC-5B0576900331}" dt="2022-08-31T01:55:05.279" v="55" actId="114"/>
+          <ac:spMkLst>
+            <pc:docMk/>
+            <pc:sldMk cId="504651817" sldId="308"/>
+            <ac:spMk id="3" creationId="{83E7DD52-8BF4-47F1-A03F-8790E75F276E}"/>
+          </ac:spMkLst>
+        </pc:spChg>
+      </pc:sldChg>
+      <pc:sldChg chg="modSp mod modNotesTx">
+        <pc:chgData name="Mitchell Wand" userId="de9b44c55c049659" providerId="LiveId" clId="{D5DCE915-3EA3-44C5-B0FC-5B0576900331}" dt="2022-08-31T02:06:38.518" v="267" actId="20577"/>
+        <pc:sldMkLst>
+          <pc:docMk/>
+          <pc:sldMk cId="2527724101" sldId="318"/>
+        </pc:sldMkLst>
+        <pc:spChg chg="mod">
+          <ac:chgData name="Mitchell Wand" userId="de9b44c55c049659" providerId="LiveId" clId="{D5DCE915-3EA3-44C5-B0FC-5B0576900331}" dt="2022-08-31T01:57:45.198" v="144" actId="20577"/>
+          <ac:spMkLst>
+            <pc:docMk/>
+            <pc:sldMk cId="2527724101" sldId="318"/>
+            <ac:spMk id="3" creationId="{3B13C7A6-A28D-4387-9F64-48979188D9B1}"/>
+          </ac:spMkLst>
+        </pc:spChg>
+      </pc:sldChg>
+    </pc:docChg>
+  </pc:docChgLst>
+</pc:chgInfo>
 </file>
 
 <file path=ppt/diagrams/colors1.xml><?xml version="1.0" encoding="utf-8"?>
@@ -3765,6 +3869,188 @@
             <p:ph type="sldImg"/>
           </p:nvPr>
         </p:nvSpPr>
+        <p:spPr/>
+      </p:sp>
+      <p:sp>
+        <p:nvSpPr>
+          <p:cNvPr id="3" name="Notes Placeholder 2"/>
+          <p:cNvSpPr>
+            <a:spLocks noGrp="1"/>
+          </p:cNvSpPr>
+          <p:nvPr>
+            <p:ph type="body" idx="1"/>
+          </p:nvPr>
+        </p:nvSpPr>
+        <p:spPr/>
+        <p:txBody>
+          <a:bodyPr/>
+          <a:lstStyle/>
+          <a:p>
+            <a:r>
+              <a:rPr lang="en-US" b="0" i="0" dirty="0" err="1">
+                <a:solidFill>
+                  <a:srgbClr val="2D3B45"/>
+                </a:solidFill>
+                <a:effectLst/>
+                <a:latin typeface="Lato Extended"/>
+              </a:rPr>
+              <a:t>Covey.Town</a:t>
+            </a:r>
+            <a:r>
+              <a:rPr lang="en-US" b="0" i="0" dirty="0">
+                <a:solidFill>
+                  <a:srgbClr val="2D3B45"/>
+                </a:solidFill>
+                <a:effectLst/>
+                <a:latin typeface="Lato Extended"/>
+              </a:rPr>
+              <a:t> provides a virtual meeting space where different groups of people can have simultaneous video calls, allowing participants to drift between different conversations, just like in real life. </a:t>
+            </a:r>
+            <a:r>
+              <a:rPr lang="en-US" b="0" i="0" dirty="0" err="1">
+                <a:solidFill>
+                  <a:srgbClr val="2D3B45"/>
+                </a:solidFill>
+                <a:effectLst/>
+                <a:latin typeface="Lato Extended"/>
+              </a:rPr>
+              <a:t>Covey.Town</a:t>
+            </a:r>
+            <a:r>
+              <a:rPr lang="en-US" b="0" i="0" dirty="0">
+                <a:solidFill>
+                  <a:srgbClr val="2D3B45"/>
+                </a:solidFill>
+                <a:effectLst/>
+                <a:latin typeface="Lato Extended"/>
+              </a:rPr>
+              <a:t> is inspired by existing products like </a:t>
+            </a:r>
+            <a:r>
+              <a:rPr lang="en-US" b="0" i="0" u="sng" dirty="0" err="1">
+                <a:effectLst/>
+                <a:latin typeface="Lato Extended"/>
+              </a:rPr>
+              <a:t>Gather.Town</a:t>
+            </a:r>
+            <a:r>
+              <a:rPr lang="en-US" b="0" i="0" u="sng" dirty="0">
+                <a:effectLst/>
+                <a:latin typeface="Lato Extended"/>
+              </a:rPr>
+              <a:t> , </a:t>
+            </a:r>
+            <a:r>
+              <a:rPr lang="en-US" b="0" i="0" u="sng" dirty="0" err="1">
+                <a:effectLst/>
+                <a:latin typeface="Lato Extended"/>
+                <a:hlinkClick r:id="rId3"/>
+              </a:rPr>
+              <a:t>Sococo</a:t>
+            </a:r>
+            <a:r>
+              <a:rPr lang="en-US" b="0" i="0" u="sng" dirty="0">
+                <a:effectLst/>
+                <a:latin typeface="Lato Extended"/>
+                <a:hlinkClick r:id="rId3"/>
+              </a:rPr>
+              <a:t> (Links to an external site.)</a:t>
+            </a:r>
+            <a:r>
+              <a:rPr lang="en-US" b="0" i="0" dirty="0">
+                <a:solidFill>
+                  <a:srgbClr val="2D3B45"/>
+                </a:solidFill>
+                <a:effectLst/>
+                <a:latin typeface="Lato Extended"/>
+              </a:rPr>
+              <a:t>, and </a:t>
+            </a:r>
+            <a:r>
+              <a:rPr lang="en-US" b="0" i="0" u="sng" dirty="0">
+                <a:effectLst/>
+                <a:latin typeface="Lato Extended"/>
+                <a:hlinkClick r:id="rId4"/>
+              </a:rPr>
+              <a:t>Gatherly.IO (Links to an external site.)</a:t>
+            </a:r>
+            <a:r>
+              <a:rPr lang="en-US" b="0" i="0" dirty="0">
+                <a:solidFill>
+                  <a:srgbClr val="2D3B45"/>
+                </a:solidFill>
+                <a:effectLst/>
+                <a:latin typeface="Lato Extended"/>
+              </a:rPr>
+              <a:t> — but it is an open source effort, and the features will be proposed and implemented by you! All implementation will take place in the TypeScript programming language, using React for the user interface.</a:t>
+            </a:r>
+            <a:endParaRPr lang="en-US" dirty="0"/>
+          </a:p>
+        </p:txBody>
+      </p:sp>
+      <p:sp>
+        <p:nvSpPr>
+          <p:cNvPr id="4" name="Slide Number Placeholder 3"/>
+          <p:cNvSpPr>
+            <a:spLocks noGrp="1"/>
+          </p:cNvSpPr>
+          <p:nvPr>
+            <p:ph type="sldNum" sz="quarter" idx="5"/>
+          </p:nvPr>
+        </p:nvSpPr>
+        <p:spPr/>
+        <p:txBody>
+          <a:bodyPr/>
+          <a:lstStyle/>
+          <a:p>
+            <a:fld id="{07937F07-1250-4CCE-B198-1B2887014F41}" type="slidenum">
+              <a:rPr lang="en-US" smtClean="0"/>
+              <a:t>16</a:t>
+            </a:fld>
+            <a:endParaRPr lang="en-US"/>
+          </a:p>
+        </p:txBody>
+      </p:sp>
+    </p:spTree>
+    <p:extLst>
+      <p:ext uri="{BB962C8B-B14F-4D97-AF65-F5344CB8AC3E}">
+        <p14:creationId xmlns:p14="http://schemas.microsoft.com/office/powerpoint/2010/main" val="1260796881"/>
+      </p:ext>
+    </p:extLst>
+  </p:cSld>
+  <p:clrMapOvr>
+    <a:masterClrMapping/>
+  </p:clrMapOvr>
+</p:notes>
+</file>
+
+<file path=ppt/notesSlides/notesSlide3.xml><?xml version="1.0" encoding="utf-8"?>
+<p:notes xmlns:a="http://schemas.openxmlformats.org/drawingml/2006/main" xmlns:r="http://schemas.openxmlformats.org/officeDocument/2006/relationships" xmlns:p="http://schemas.openxmlformats.org/presentationml/2006/main">
+  <p:cSld>
+    <p:spTree>
+      <p:nvGrpSpPr>
+        <p:cNvPr id="1" name=""/>
+        <p:cNvGrpSpPr/>
+        <p:nvPr/>
+      </p:nvGrpSpPr>
+      <p:grpSpPr>
+        <a:xfrm>
+          <a:off x="0" y="0"/>
+          <a:ext cx="0" cy="0"/>
+          <a:chOff x="0" y="0"/>
+          <a:chExt cx="0" cy="0"/>
+        </a:xfrm>
+      </p:grpSpPr>
+      <p:sp>
+        <p:nvSpPr>
+          <p:cNvPr id="2" name="Slide Image Placeholder 1"/>
+          <p:cNvSpPr>
+            <a:spLocks noGrp="1" noRot="1" noChangeAspect="1"/>
+          </p:cNvSpPr>
+          <p:nvPr>
+            <p:ph type="sldImg"/>
+          </p:nvPr>
+        </p:nvSpPr>
         <p:spPr>
           <a:xfrm>
             <a:off x="325438" y="698500"/>
@@ -7937,7 +8223,9 @@
         </p:nvSpPr>
         <p:spPr/>
         <p:txBody>
-          <a:bodyPr/>
+          <a:bodyPr>
+            <a:normAutofit lnSpcReduction="10000"/>
+          </a:bodyPr>
           <a:lstStyle/>
           <a:p>
             <a:r>
@@ -7953,21 +8241,23 @@
             </a:r>
           </a:p>
           <a:p>
-            <a:pPr lvl="1"/>
-            <a:r>
-              <a:rPr lang="en-US" dirty="0"/>
-              <a:t>we will move some material forward to make sure that you have the learning you need when you need it</a:t>
-            </a:r>
-          </a:p>
-          <a:p>
-            <a:pPr lvl="1"/>
-            <a:r>
-              <a:rPr lang="en-US" dirty="0"/>
-              <a:t>Will start with several individual homework assignments</a:t>
-            </a:r>
-          </a:p>
-          <a:p>
-            <a:pPr lvl="1"/>
+            <a:r>
+              <a:rPr lang="en-US" dirty="0"/>
+              <a:t>We will move some material forward to make sure that you have the learning you need when you need it</a:t>
+            </a:r>
+          </a:p>
+          <a:p>
+            <a:r>
+              <a:rPr lang="en-US" dirty="0"/>
+              <a:t>We will start with an individual project, divided into 2 </a:t>
+            </a:r>
+            <a:r>
+              <a:rPr lang="en-US" dirty="0" err="1"/>
+              <a:t>homeworks</a:t>
+            </a:r>
+            <a:endParaRPr lang="en-US" dirty="0"/>
+          </a:p>
+          <a:p>
             <a:r>
               <a:rPr lang="en-US" dirty="0"/>
               <a:t>Then a group project, done in teams of about 4 people</a:t>
@@ -8398,15 +8688,7 @@
             </a:r>
             <a:r>
               <a:rPr lang="en-US" dirty="0"/>
-              <a:t>to </a:t>
-            </a:r>
-            <a:r>
-              <a:rPr lang="en-US" b="1" i="1" dirty="0"/>
-              <a:t>grade</a:t>
-            </a:r>
-            <a:r>
-              <a:rPr lang="en-US" dirty="0"/>
-              <a:t> in-class activities.</a:t>
+              <a:t>to grade in-class activities.</a:t>
             </a:r>
           </a:p>
           <a:p>
@@ -8529,19 +8811,27 @@
           <a:p>
             <a:r>
               <a:rPr lang="en-US" dirty="0"/>
-              <a:t>There will be two homework assignments due during the first half of the term, plus a final project that will be due at the end of the term.</a:t>
-            </a:r>
-          </a:p>
-          <a:p>
-            <a:r>
-              <a:rPr lang="en-US" dirty="0"/>
-              <a:t>You will complete the assignments individually</a:t>
-            </a:r>
-          </a:p>
-          <a:p>
-            <a:r>
-              <a:rPr lang="en-US" dirty="0"/>
-              <a:t>You will work on the project in a group of 4 or 5.</a:t>
+              <a:t>We will start with an individual project, divided into 2 </a:t>
+            </a:r>
+            <a:r>
+              <a:rPr lang="en-US" dirty="0" err="1"/>
+              <a:t>homeworks</a:t>
+            </a:r>
+            <a:r>
+              <a:rPr lang="en-US" dirty="0"/>
+              <a:t>.  This is to be done individually</a:t>
+            </a:r>
+          </a:p>
+          <a:p>
+            <a:r>
+              <a:rPr lang="en-US" dirty="0"/>
+              <a:t>Then a group project, done in teams of about 4 people</a:t>
+            </a:r>
+          </a:p>
+          <a:p>
+            <a:r>
+              <a:rPr lang="en-US" dirty="0"/>
+              <a:t>There will be an exam in Week 9.</a:t>
             </a:r>
           </a:p>
           <a:p>
@@ -8554,7 +8844,7 @@
             <a:pPr lvl="1"/>
             <a:r>
               <a:rPr lang="en-US" dirty="0"/>
-              <a:t>30% Assignments (i.e., Individual Projects)</a:t>
+              <a:t>30% Assignments (i.e., the Individual Project)</a:t>
             </a:r>
           </a:p>
           <a:p>
@@ -8720,7 +9010,7 @@
           <a:p>
             <a:r>
               <a:rPr lang="en-US" dirty="0"/>
-              <a:t>Further breakdown of project grade (i.e., 40%) is:</a:t>
+              <a:t>Further breakdown of team project grade (i.e., 40%) is:</a:t>
             </a:r>
           </a:p>
           <a:p>
@@ -8803,7 +9093,7 @@
           <p:nvPr/>
         </p:nvPicPr>
         <p:blipFill>
-          <a:blip r:embed="rId2">
+          <a:blip r:embed="rId3">
             <a:extLst>
               <a:ext uri="{28A0092B-C50C-407E-A947-70E740481C1C}">
                 <a14:useLocalDpi xmlns:a14="http://schemas.microsoft.com/office/drawing/2010/main" val="0"/>
@@ -9128,7 +9418,14 @@
           <a:p>
             <a:r>
               <a:rPr lang="en-US" dirty="0"/>
-              <a:t>If you have concerns regarding the grading of your work, please let us know right away. </a:t>
+              <a:t>If you have concerns regarding the grading of your work, please let us know right away.</a:t>
+            </a:r>
+          </a:p>
+          <a:p>
+            <a:pPr lvl="1"/>
+            <a:r>
+              <a:rPr lang="en-US" dirty="0"/>
+              <a:t>We will provide a dedicated portal for regrade requests. </a:t>
             </a:r>
           </a:p>
           <a:p>
@@ -9148,25 +9445,6 @@
             <a:r>
               <a:rPr lang="en-US" dirty="0"/>
               <a:t> post on Piazza or email your TA or instructor </a:t>
-            </a:r>
-          </a:p>
-          <a:p>
-            <a:pPr lvl="2"/>
-            <a:r>
-              <a:rPr lang="en-US" dirty="0" err="1">
-                <a:highlight>
-                  <a:srgbClr val="FFFF00"/>
-                </a:highlight>
-              </a:rPr>
-              <a:t>GradeScope</a:t>
-            </a:r>
-            <a:r>
-              <a:rPr lang="en-US" dirty="0">
-                <a:highlight>
-                  <a:srgbClr val="FFFF00"/>
-                </a:highlight>
-              </a:rPr>
-              <a:t> provides an interface that allows us to review all regrade requests in one place. </a:t>
             </a:r>
           </a:p>
           <a:p>
@@ -9281,7 +9559,7 @@
         <p:spPr/>
         <p:txBody>
           <a:bodyPr>
-            <a:normAutofit/>
+            <a:normAutofit lnSpcReduction="10000"/>
           </a:bodyPr>
           <a:lstStyle/>
           <a:p>
@@ -9323,18 +9601,14 @@
             <a:pPr lvl="1"/>
             <a:r>
               <a:rPr lang="en-US" dirty="0"/>
-              <a:t>If you have an accommodation from Disability Services, you must request it for each assignment.</a:t>
+              <a:t>If you have an accommodation from Disability Services, you must request it from the instructors separately for each assignment or exam.</a:t>
             </a:r>
           </a:p>
           <a:p>
             <a:pPr lvl="2"/>
             <a:r>
               <a:rPr lang="en-US" dirty="0"/>
-              <a:t>DSS Accommodations for </a:t>
-            </a:r>
-            <a:r>
-              <a:rPr lang="en-US" b="1" dirty="0"/>
-              <a:t>Group Assignment</a:t>
+              <a:t>DSS Accommodations for group assignments</a:t>
             </a:r>
           </a:p>
         </p:txBody>
@@ -12306,7 +12580,7 @@
           </a:ln>
           <a:extLst>
             <a:ext uri="{C572A759-6A51-4108-AA02-DFA0A04FC94B}">
-              <ma14:wrappingTextBoxFlag xmlns:ma14="http://schemas.microsoft.com/office/mac/drawingml/2011/main" xmlns:a14="http://schemas.microsoft.com/office/drawing/2010/main" xmlns:m="http://schemas.openxmlformats.org/officeDocument/2006/math" xmlns="" val="1"/>
+              <ma14:wrappingTextBoxFlag xmlns="" xmlns:m="http://schemas.openxmlformats.org/officeDocument/2006/math" xmlns:a14="http://schemas.microsoft.com/office/drawing/2010/main" xmlns:ma14="http://schemas.microsoft.com/office/mac/drawingml/2011/main" val="1"/>
             </a:ext>
           </a:extLst>
         </p:spPr>
@@ -12367,7 +12641,7 @@
           </a:ln>
           <a:extLst>
             <a:ext uri="{C572A759-6A51-4108-AA02-DFA0A04FC94B}">
-              <ma14:wrappingTextBoxFlag xmlns:ma14="http://schemas.microsoft.com/office/mac/drawingml/2011/main" xmlns:a14="http://schemas.microsoft.com/office/drawing/2010/main" xmlns:m="http://schemas.openxmlformats.org/officeDocument/2006/math" xmlns="" val="1"/>
+              <ma14:wrappingTextBoxFlag xmlns="" xmlns:m="http://schemas.openxmlformats.org/officeDocument/2006/math" xmlns:a14="http://schemas.microsoft.com/office/drawing/2010/main" xmlns:ma14="http://schemas.microsoft.com/office/mac/drawingml/2011/main" val="1"/>
             </a:ext>
           </a:extLst>
         </p:spPr>

</xml_diff>

<commit_message>
added note for DSS Accommodations for Group assignments
</commit_message>
<xml_diff>
--- a/Slides/Lesson 1.1 Course Introduction.pptx
+++ b/Slides/Lesson 1.1 Course Introduction.pptx
@@ -3787,7 +3787,10 @@
           <a:bodyPr/>
           <a:lstStyle/>
           <a:p>
-            <a:endParaRPr lang="en-US" dirty="0"/>
+            <a:r>
+              <a:rPr lang="en-US" dirty="0"/>
+              <a:t>Group Assignments are often NOT eligible for DSS Accommodations</a:t>
+            </a:r>
           </a:p>
         </p:txBody>
       </p:sp>
@@ -12306,7 +12309,7 @@
           </a:ln>
           <a:extLst>
             <a:ext uri="{C572A759-6A51-4108-AA02-DFA0A04FC94B}">
-              <ma14:wrappingTextBoxFlag xmlns:ma14="http://schemas.microsoft.com/office/mac/drawingml/2011/main" xmlns:a14="http://schemas.microsoft.com/office/drawing/2010/main" xmlns:m="http://schemas.openxmlformats.org/officeDocument/2006/math" xmlns="" val="1"/>
+              <ma14:wrappingTextBoxFlag xmlns="" xmlns:m="http://schemas.openxmlformats.org/officeDocument/2006/math" xmlns:a14="http://schemas.microsoft.com/office/drawing/2010/main" xmlns:ma14="http://schemas.microsoft.com/office/mac/drawingml/2011/main" val="1"/>
             </a:ext>
           </a:extLst>
         </p:spPr>
@@ -12367,7 +12370,7 @@
           </a:ln>
           <a:extLst>
             <a:ext uri="{C572A759-6A51-4108-AA02-DFA0A04FC94B}">
-              <ma14:wrappingTextBoxFlag xmlns:ma14="http://schemas.microsoft.com/office/mac/drawingml/2011/main" xmlns:a14="http://schemas.microsoft.com/office/drawing/2010/main" xmlns:m="http://schemas.openxmlformats.org/officeDocument/2006/math" xmlns="" val="1"/>
+              <ma14:wrappingTextBoxFlag xmlns="" xmlns:m="http://schemas.openxmlformats.org/officeDocument/2006/math" xmlns:a14="http://schemas.microsoft.com/office/drawing/2010/main" xmlns:ma14="http://schemas.microsoft.com/office/mac/drawingml/2011/main" val="1"/>
             </a:ext>
           </a:extLst>
         </p:spPr>

</xml_diff>

<commit_message>
updated files with edits from meeting
</commit_message>
<xml_diff>
--- a/Slides/Lesson 1.1 Course Introduction.pptx
+++ b/Slides/Lesson 1.1 Course Introduction.pptx
@@ -1366,7 +1366,7 @@
   <dgm:whole/>
   <dgm:extLst>
     <a:ext uri="http://schemas.microsoft.com/office/drawing/2008/diagram">
-      <dsp:dataModelExt xmlns:dsp="http://schemas.microsoft.com/office/drawing/2008/diagram" relId="rId6" minVer="http://schemas.openxmlformats.org/drawingml/2006/diagram"/>
+      <dsp:dataModelExt xmlns:dsp="http://schemas.microsoft.com/office/drawing/2008/diagram" relId="rId7" minVer="http://schemas.openxmlformats.org/drawingml/2006/diagram"/>
     </a:ext>
   </dgm:extLst>
 </dgm:dataModel>
@@ -3500,7 +3500,7 @@
           <a:p>
             <a:fld id="{7C7E5181-6CF5-45F7-A87A-E0E0B1FD7549}" type="datetimeFigureOut">
               <a:rPr lang="en-US" smtClean="0"/>
-              <a:t>8/30/2022</a:t>
+              <a:t>8/31/2022</a:t>
             </a:fld>
             <a:endParaRPr lang="en-US"/>
           </a:p>
@@ -3870,7 +3870,7 @@
       </p:grpSpPr>
       <p:sp>
         <p:nvSpPr>
-          <p:cNvPr id="206" name="Shape 206"/>
+          <p:cNvPr id="2" name="Slide Image Placeholder 1"/>
           <p:cNvSpPr>
             <a:spLocks noGrp="1" noRot="1" noChangeAspect="1"/>
           </p:cNvSpPr>
@@ -3878,47 +3878,56 @@
             <p:ph type="sldImg"/>
           </p:nvPr>
         </p:nvSpPr>
-        <p:spPr>
-          <a:xfrm>
-            <a:off x="325438" y="698500"/>
-            <a:ext cx="6207125" cy="3492500"/>
-          </a:xfrm>
-          <a:prstGeom prst="rect">
-            <a:avLst/>
-          </a:prstGeom>
-        </p:spPr>
+        <p:spPr/>
+      </p:sp>
+      <p:sp>
+        <p:nvSpPr>
+          <p:cNvPr id="3" name="Notes Placeholder 2"/>
+          <p:cNvSpPr>
+            <a:spLocks noGrp="1"/>
+          </p:cNvSpPr>
+          <p:nvPr>
+            <p:ph type="body" idx="1"/>
+          </p:nvPr>
+        </p:nvSpPr>
+        <p:spPr/>
         <p:txBody>
           <a:bodyPr/>
           <a:lstStyle/>
           <a:p>
-            <a:endParaRPr/>
-          </a:p>
-        </p:txBody>
-      </p:sp>
-      <p:sp>
-        <p:nvSpPr>
-          <p:cNvPr id="207" name="Shape 207"/>
+            <a:endParaRPr lang="en-US" dirty="0"/>
+          </a:p>
+        </p:txBody>
+      </p:sp>
+      <p:sp>
+        <p:nvSpPr>
+          <p:cNvPr id="4" name="Slide Number Placeholder 3"/>
           <p:cNvSpPr>
             <a:spLocks noGrp="1"/>
           </p:cNvSpPr>
           <p:nvPr>
-            <p:ph type="body" sz="quarter" idx="1"/>
-          </p:nvPr>
-        </p:nvSpPr>
-        <p:spPr>
-          <a:prstGeom prst="rect">
-            <a:avLst/>
-          </a:prstGeom>
-        </p:spPr>
+            <p:ph type="sldNum" sz="quarter" idx="5"/>
+          </p:nvPr>
+        </p:nvSpPr>
+        <p:spPr/>
         <p:txBody>
           <a:bodyPr/>
           <a:lstStyle/>
           <a:p>
-            <a:endParaRPr dirty="0"/>
+            <a:fld id="{07937F07-1250-4CCE-B198-1B2887014F41}" type="slidenum">
+              <a:rPr lang="en-US" smtClean="0"/>
+              <a:t>6</a:t>
+            </a:fld>
+            <a:endParaRPr lang="en-US"/>
           </a:p>
         </p:txBody>
       </p:sp>
     </p:spTree>
+    <p:extLst>
+      <p:ext uri="{BB962C8B-B14F-4D97-AF65-F5344CB8AC3E}">
+        <p14:creationId xmlns:p14="http://schemas.microsoft.com/office/powerpoint/2010/main" val="2005691703"/>
+      </p:ext>
+    </p:extLst>
   </p:cSld>
   <p:clrMapOvr>
     <a:masterClrMapping/>
@@ -3945,7 +3954,7 @@
       </p:grpSpPr>
       <p:sp>
         <p:nvSpPr>
-          <p:cNvPr id="2" name="Slide Image Placeholder 1"/>
+          <p:cNvPr id="206" name="Shape 206"/>
           <p:cNvSpPr>
             <a:spLocks noGrp="1" noRot="1" noChangeAspect="1"/>
           </p:cNvSpPr>
@@ -3953,154 +3962,47 @@
             <p:ph type="sldImg"/>
           </p:nvPr>
         </p:nvSpPr>
-        <p:spPr/>
-      </p:sp>
-      <p:sp>
-        <p:nvSpPr>
-          <p:cNvPr id="3" name="Notes Placeholder 2"/>
-          <p:cNvSpPr>
-            <a:spLocks noGrp="1"/>
-          </p:cNvSpPr>
-          <p:nvPr>
-            <p:ph type="body" idx="1"/>
-          </p:nvPr>
-        </p:nvSpPr>
-        <p:spPr/>
+        <p:spPr>
+          <a:xfrm>
+            <a:off x="325438" y="698500"/>
+            <a:ext cx="6207125" cy="3492500"/>
+          </a:xfrm>
+          <a:prstGeom prst="rect">
+            <a:avLst/>
+          </a:prstGeom>
+        </p:spPr>
         <p:txBody>
           <a:bodyPr/>
           <a:lstStyle/>
           <a:p>
-            <a:r>
-              <a:rPr lang="en-US" b="0" i="0" dirty="0" err="1">
-                <a:solidFill>
-                  <a:srgbClr val="2D3B45"/>
-                </a:solidFill>
-                <a:effectLst/>
-                <a:latin typeface="Lato Extended"/>
-              </a:rPr>
-              <a:t>Covey.Town</a:t>
-            </a:r>
-            <a:r>
-              <a:rPr lang="en-US" b="0" i="0" dirty="0">
-                <a:solidFill>
-                  <a:srgbClr val="2D3B45"/>
-                </a:solidFill>
-                <a:effectLst/>
-                <a:latin typeface="Lato Extended"/>
-              </a:rPr>
-              <a:t> provides a virtual meeting space where different groups of people can have simultaneous video calls, allowing participants to drift between different conversations, just like in real life. </a:t>
-            </a:r>
-            <a:r>
-              <a:rPr lang="en-US" b="0" i="0" dirty="0" err="1">
-                <a:solidFill>
-                  <a:srgbClr val="2D3B45"/>
-                </a:solidFill>
-                <a:effectLst/>
-                <a:latin typeface="Lato Extended"/>
-              </a:rPr>
-              <a:t>Covey.Town</a:t>
-            </a:r>
-            <a:r>
-              <a:rPr lang="en-US" b="0" i="0" dirty="0">
-                <a:solidFill>
-                  <a:srgbClr val="2D3B45"/>
-                </a:solidFill>
-                <a:effectLst/>
-                <a:latin typeface="Lato Extended"/>
-              </a:rPr>
-              <a:t> is inspired by existing products like </a:t>
-            </a:r>
-            <a:r>
-              <a:rPr lang="en-US" b="0" i="0" u="sng" dirty="0" err="1">
-                <a:effectLst/>
-                <a:latin typeface="Lato Extended"/>
-              </a:rPr>
-              <a:t>Gather.Town</a:t>
-            </a:r>
-            <a:r>
-              <a:rPr lang="en-US" b="0" i="0" u="sng" dirty="0">
-                <a:effectLst/>
-                <a:latin typeface="Lato Extended"/>
-              </a:rPr>
-              <a:t> , </a:t>
-            </a:r>
-            <a:r>
-              <a:rPr lang="en-US" b="0" i="0" u="sng" dirty="0" err="1">
-                <a:effectLst/>
-                <a:latin typeface="Lato Extended"/>
-                <a:hlinkClick r:id="rId3"/>
-              </a:rPr>
-              <a:t>Sococo</a:t>
-            </a:r>
-            <a:r>
-              <a:rPr lang="en-US" b="0" i="0" u="sng" dirty="0">
-                <a:effectLst/>
-                <a:latin typeface="Lato Extended"/>
-                <a:hlinkClick r:id="rId3"/>
-              </a:rPr>
-              <a:t> (Links to an external site.)</a:t>
-            </a:r>
-            <a:r>
-              <a:rPr lang="en-US" b="0" i="0" dirty="0">
-                <a:solidFill>
-                  <a:srgbClr val="2D3B45"/>
-                </a:solidFill>
-                <a:effectLst/>
-                <a:latin typeface="Lato Extended"/>
-              </a:rPr>
-              <a:t>, and </a:t>
-            </a:r>
-            <a:r>
-              <a:rPr lang="en-US" b="0" i="0" u="sng" dirty="0">
-                <a:effectLst/>
-                <a:latin typeface="Lato Extended"/>
-                <a:hlinkClick r:id="rId4"/>
-              </a:rPr>
-              <a:t>Gatherly.IO (Links to an external site.)</a:t>
-            </a:r>
-            <a:r>
-              <a:rPr lang="en-US" b="0" i="0" dirty="0">
-                <a:solidFill>
-                  <a:srgbClr val="2D3B45"/>
-                </a:solidFill>
-                <a:effectLst/>
-                <a:latin typeface="Lato Extended"/>
-              </a:rPr>
-              <a:t> — but it is an open source effort, and the features will be proposed and implemented by you! All implementation will take place in the TypeScript programming language, using React for the user interface.</a:t>
-            </a:r>
-            <a:endParaRPr lang="en-US" dirty="0"/>
-          </a:p>
-        </p:txBody>
-      </p:sp>
-      <p:sp>
-        <p:nvSpPr>
-          <p:cNvPr id="4" name="Slide Number Placeholder 3"/>
+            <a:endParaRPr/>
+          </a:p>
+        </p:txBody>
+      </p:sp>
+      <p:sp>
+        <p:nvSpPr>
+          <p:cNvPr id="207" name="Shape 207"/>
           <p:cNvSpPr>
             <a:spLocks noGrp="1"/>
           </p:cNvSpPr>
           <p:nvPr>
-            <p:ph type="sldNum" sz="quarter" idx="5"/>
-          </p:nvPr>
-        </p:nvSpPr>
-        <p:spPr/>
+            <p:ph type="body" sz="quarter" idx="1"/>
+          </p:nvPr>
+        </p:nvSpPr>
+        <p:spPr>
+          <a:prstGeom prst="rect">
+            <a:avLst/>
+          </a:prstGeom>
+        </p:spPr>
         <p:txBody>
           <a:bodyPr/>
           <a:lstStyle/>
           <a:p>
-            <a:fld id="{07937F07-1250-4CCE-B198-1B2887014F41}" type="slidenum">
-              <a:rPr lang="en-US" smtClean="0"/>
-              <a:t>16</a:t>
-            </a:fld>
-            <a:endParaRPr lang="en-US"/>
+            <a:endParaRPr dirty="0"/>
           </a:p>
         </p:txBody>
       </p:sp>
     </p:spTree>
-    <p:extLst>
-      <p:ext uri="{BB962C8B-B14F-4D97-AF65-F5344CB8AC3E}">
-        <p14:creationId xmlns:p14="http://schemas.microsoft.com/office/powerpoint/2010/main" val="1260796881"/>
-      </p:ext>
-    </p:extLst>
   </p:cSld>
   <p:clrMapOvr>
     <a:masterClrMapping/>
@@ -4135,6 +4037,180 @@
             <p:ph type="sldImg"/>
           </p:nvPr>
         </p:nvSpPr>
+        <p:spPr/>
+      </p:sp>
+      <p:sp>
+        <p:nvSpPr>
+          <p:cNvPr id="3" name="Notes Placeholder 2"/>
+          <p:cNvSpPr>
+            <a:spLocks noGrp="1"/>
+          </p:cNvSpPr>
+          <p:nvPr>
+            <p:ph type="body" idx="1"/>
+          </p:nvPr>
+        </p:nvSpPr>
+        <p:spPr/>
+        <p:txBody>
+          <a:bodyPr/>
+          <a:lstStyle/>
+          <a:p>
+            <a:r>
+              <a:rPr lang="en-US" b="0" i="0" dirty="0" err="1">
+                <a:solidFill>
+                  <a:srgbClr val="2D3B45"/>
+                </a:solidFill>
+                <a:effectLst/>
+                <a:latin typeface="Lato Extended"/>
+              </a:rPr>
+              <a:t>Covey.Town</a:t>
+            </a:r>
+            <a:r>
+              <a:rPr lang="en-US" b="0" i="0" dirty="0">
+                <a:solidFill>
+                  <a:srgbClr val="2D3B45"/>
+                </a:solidFill>
+                <a:effectLst/>
+                <a:latin typeface="Lato Extended"/>
+              </a:rPr>
+              <a:t> provides a virtual meeting space where different groups of people can have simultaneous video calls, allowing participants to drift between different conversations, just like in real life. </a:t>
+            </a:r>
+            <a:r>
+              <a:rPr lang="en-US" b="0" i="0" dirty="0" err="1">
+                <a:solidFill>
+                  <a:srgbClr val="2D3B45"/>
+                </a:solidFill>
+                <a:effectLst/>
+                <a:latin typeface="Lato Extended"/>
+              </a:rPr>
+              <a:t>Covey.Town</a:t>
+            </a:r>
+            <a:r>
+              <a:rPr lang="en-US" b="0" i="0" dirty="0">
+                <a:solidFill>
+                  <a:srgbClr val="2D3B45"/>
+                </a:solidFill>
+                <a:effectLst/>
+                <a:latin typeface="Lato Extended"/>
+              </a:rPr>
+              <a:t> is inspired by existing products like </a:t>
+            </a:r>
+            <a:r>
+              <a:rPr lang="en-US" b="0" i="0" u="sng" dirty="0" err="1">
+                <a:effectLst/>
+                <a:latin typeface="Lato Extended"/>
+              </a:rPr>
+              <a:t>Gather.Town</a:t>
+            </a:r>
+            <a:r>
+              <a:rPr lang="en-US" b="0" i="0" u="sng" dirty="0">
+                <a:effectLst/>
+                <a:latin typeface="Lato Extended"/>
+              </a:rPr>
+              <a:t> , </a:t>
+            </a:r>
+            <a:r>
+              <a:rPr lang="en-US" b="0" i="0" u="sng" dirty="0" err="1">
+                <a:effectLst/>
+                <a:latin typeface="Lato Extended"/>
+                <a:hlinkClick r:id="rId3"/>
+              </a:rPr>
+              <a:t>Sococo</a:t>
+            </a:r>
+            <a:r>
+              <a:rPr lang="en-US" b="0" i="0" dirty="0">
+                <a:solidFill>
+                  <a:srgbClr val="2D3B45"/>
+                </a:solidFill>
+                <a:effectLst/>
+                <a:latin typeface="Lato Extended"/>
+              </a:rPr>
+              <a:t>, and </a:t>
+            </a:r>
+            <a:r>
+              <a:rPr lang="en-US" b="0" i="0" u="sng" dirty="0">
+                <a:effectLst/>
+                <a:latin typeface="Lato Extended"/>
+                <a:hlinkClick r:id="rId4"/>
+              </a:rPr>
+              <a:t>Gatherly.IO</a:t>
+            </a:r>
+            <a:r>
+              <a:rPr lang="en-US" b="0" i="0" dirty="0">
+                <a:solidFill>
+                  <a:srgbClr val="2D3B45"/>
+                </a:solidFill>
+                <a:effectLst/>
+                <a:latin typeface="Lato Extended"/>
+              </a:rPr>
+              <a:t>— but it is an open source effort, and the features will be proposed and implemented by you! All implementation will take place in the TypeScript programming language, using React for the user interface.</a:t>
+            </a:r>
+            <a:endParaRPr lang="en-US" dirty="0"/>
+          </a:p>
+        </p:txBody>
+      </p:sp>
+      <p:sp>
+        <p:nvSpPr>
+          <p:cNvPr id="4" name="Slide Number Placeholder 3"/>
+          <p:cNvSpPr>
+            <a:spLocks noGrp="1"/>
+          </p:cNvSpPr>
+          <p:nvPr>
+            <p:ph type="sldNum" sz="quarter" idx="5"/>
+          </p:nvPr>
+        </p:nvSpPr>
+        <p:spPr/>
+        <p:txBody>
+          <a:bodyPr/>
+          <a:lstStyle/>
+          <a:p>
+            <a:fld id="{07937F07-1250-4CCE-B198-1B2887014F41}" type="slidenum">
+              <a:rPr lang="en-US" smtClean="0"/>
+              <a:t>16</a:t>
+            </a:fld>
+            <a:endParaRPr lang="en-US"/>
+          </a:p>
+        </p:txBody>
+      </p:sp>
+    </p:spTree>
+    <p:extLst>
+      <p:ext uri="{BB962C8B-B14F-4D97-AF65-F5344CB8AC3E}">
+        <p14:creationId xmlns:p14="http://schemas.microsoft.com/office/powerpoint/2010/main" val="1260796881"/>
+      </p:ext>
+    </p:extLst>
+  </p:cSld>
+  <p:clrMapOvr>
+    <a:masterClrMapping/>
+  </p:clrMapOvr>
+</p:notes>
+</file>
+
+<file path=ppt/notesSlides/notesSlide5.xml><?xml version="1.0" encoding="utf-8"?>
+<p:notes xmlns:a="http://schemas.openxmlformats.org/drawingml/2006/main" xmlns:r="http://schemas.openxmlformats.org/officeDocument/2006/relationships" xmlns:p="http://schemas.openxmlformats.org/presentationml/2006/main">
+  <p:cSld>
+    <p:spTree>
+      <p:nvGrpSpPr>
+        <p:cNvPr id="1" name=""/>
+        <p:cNvGrpSpPr/>
+        <p:nvPr/>
+      </p:nvGrpSpPr>
+      <p:grpSpPr>
+        <a:xfrm>
+          <a:off x="0" y="0"/>
+          <a:ext cx="0" cy="0"/>
+          <a:chOff x="0" y="0"/>
+          <a:chExt cx="0" cy="0"/>
+        </a:xfrm>
+      </p:grpSpPr>
+      <p:sp>
+        <p:nvSpPr>
+          <p:cNvPr id="2" name="Slide Image Placeholder 1"/>
+          <p:cNvSpPr>
+            <a:spLocks noGrp="1" noRot="1" noChangeAspect="1"/>
+          </p:cNvSpPr>
+          <p:nvPr>
+            <p:ph type="sldImg"/>
+          </p:nvPr>
+        </p:nvSpPr>
         <p:spPr>
           <a:xfrm>
             <a:off x="325438" y="698500"/>
@@ -4157,10 +4233,7 @@
           <a:bodyPr/>
           <a:lstStyle/>
           <a:p>
-            <a:r>
-              <a:rPr lang="en-US" dirty="0"/>
-              <a:t>DSS Accommodations are usually NOT available for Group Assignments</a:t>
-            </a:r>
+            <a:endParaRPr lang="en-US" dirty="0"/>
           </a:p>
         </p:txBody>
       </p:sp>
@@ -4331,7 +4404,7 @@
           <a:p>
             <a:fld id="{5D2A64DE-480B-420F-9649-4F8E696E08E0}" type="datetime1">
               <a:rPr lang="en-US" smtClean="0"/>
-              <a:t>8/30/2022</a:t>
+              <a:t>8/31/2022</a:t>
             </a:fld>
             <a:endParaRPr lang="en-US"/>
           </a:p>
@@ -4565,7 +4638,7 @@
           <a:p>
             <a:fld id="{0D3616D0-8311-4107-9726-6B805E7D05BA}" type="datetime1">
               <a:rPr lang="en-US" smtClean="0"/>
-              <a:t>8/30/2022</a:t>
+              <a:t>8/31/2022</a:t>
             </a:fld>
             <a:endParaRPr lang="en-US"/>
           </a:p>
@@ -4773,7 +4846,7 @@
           <a:p>
             <a:fld id="{3BC2557A-5C88-417A-A763-5AC779462A5F}" type="datetime1">
               <a:rPr lang="en-US" smtClean="0"/>
-              <a:t>8/30/2022</a:t>
+              <a:t>8/31/2022</a:t>
             </a:fld>
             <a:endParaRPr lang="en-US"/>
           </a:p>
@@ -5297,7 +5370,7 @@
           <a:p>
             <a:fld id="{07C7BFD4-467E-4EDE-93EA-052F5B39A4E5}" type="datetime1">
               <a:rPr lang="en-US" smtClean="0"/>
-              <a:t>8/30/2022</a:t>
+              <a:t>8/31/2022</a:t>
             </a:fld>
             <a:endParaRPr lang="en-US"/>
           </a:p>
@@ -5610,7 +5683,7 @@
           <a:p>
             <a:fld id="{A533CBE2-D5BE-47AC-ADC2-9CDFC1D0CF90}" type="datetime1">
               <a:rPr lang="en-US" smtClean="0"/>
-              <a:t>8/30/2022</a:t>
+              <a:t>8/31/2022</a:t>
             </a:fld>
             <a:endParaRPr lang="en-US"/>
           </a:p>
@@ -5911,7 +5984,7 @@
           <a:p>
             <a:fld id="{39B7EDB1-CE74-4951-85A2-0B01C2128E28}" type="datetime1">
               <a:rPr lang="en-US" smtClean="0"/>
-              <a:t>8/30/2022</a:t>
+              <a:t>8/31/2022</a:t>
             </a:fld>
             <a:endParaRPr lang="en-US"/>
           </a:p>
@@ -6359,7 +6432,7 @@
           <a:p>
             <a:fld id="{2BC7EB92-A5C2-4807-A9DC-9EDE6CBFB241}" type="datetime1">
               <a:rPr lang="en-US" smtClean="0"/>
-              <a:t>8/30/2022</a:t>
+              <a:t>8/31/2022</a:t>
             </a:fld>
             <a:endParaRPr lang="en-US"/>
           </a:p>
@@ -6505,7 +6578,7 @@
           <a:p>
             <a:fld id="{109E55A0-C911-4F03-82FC-7E5926047D46}" type="datetime1">
               <a:rPr lang="en-US" smtClean="0"/>
-              <a:t>8/30/2022</a:t>
+              <a:t>8/31/2022</a:t>
             </a:fld>
             <a:endParaRPr lang="en-US"/>
           </a:p>
@@ -6654,7 +6727,7 @@
           <a:p>
             <a:fld id="{2B7B7EE0-7771-4CD5-9B2B-3550753A54A1}" type="datetime1">
               <a:rPr lang="en-US" smtClean="0"/>
-              <a:t>8/30/2022</a:t>
+              <a:t>8/31/2022</a:t>
             </a:fld>
             <a:endParaRPr lang="en-US"/>
           </a:p>
@@ -6965,7 +7038,7 @@
           <a:p>
             <a:fld id="{F8B318B3-0E87-4416-A9B8-D891968C2727}" type="datetime1">
               <a:rPr lang="en-US" smtClean="0"/>
-              <a:t>8/30/2022</a:t>
+              <a:t>8/31/2022</a:t>
             </a:fld>
             <a:endParaRPr lang="en-US"/>
           </a:p>
@@ -7253,7 +7326,7 @@
           <a:p>
             <a:fld id="{EA476A42-A091-4468-A075-64A31BE59948}" type="datetime1">
               <a:rPr lang="en-US" smtClean="0"/>
-              <a:t>8/30/2022</a:t>
+              <a:t>8/31/2022</a:t>
             </a:fld>
             <a:endParaRPr lang="en-US"/>
           </a:p>
@@ -7494,7 +7567,7 @@
           <a:p>
             <a:fld id="{54D997E8-DDEE-43F1-8D9B-F8A1E11DE488}" type="datetime1">
               <a:rPr lang="en-US" smtClean="0"/>
-              <a:t>8/30/2022</a:t>
+              <a:t>8/31/2022</a:t>
             </a:fld>
             <a:endParaRPr lang="en-US"/>
           </a:p>
@@ -8179,7 +8252,7 @@
           <a:p>
             <a:r>
               <a:rPr lang="en-US" dirty="0"/>
-              <a:t>By the end of this course you will--</a:t>
+              <a:t>By the end of this course, you will--</a:t>
             </a:r>
           </a:p>
           <a:p>
@@ -8465,6 +8538,13 @@
             <a:pPr lvl="1"/>
             <a:r>
               <a:rPr lang="en-US" dirty="0"/>
+              <a:t>Jest as Testing Framework</a:t>
+            </a:r>
+          </a:p>
+          <a:p>
+            <a:pPr lvl="1"/>
+            <a:r>
+              <a:rPr lang="en-US" dirty="0"/>
               <a:t>Visual Studio Code as our IDE</a:t>
             </a:r>
           </a:p>
@@ -8472,14 +8552,28 @@
             <a:pPr lvl="1"/>
             <a:r>
               <a:rPr lang="en-US" dirty="0"/>
-              <a:t>REACT for web pages</a:t>
+              <a:t>React for webapps</a:t>
             </a:r>
           </a:p>
           <a:p>
             <a:pPr lvl="1"/>
             <a:r>
               <a:rPr lang="en-US" dirty="0"/>
-              <a:t>Also git, and other miscellaneous tools</a:t>
+              <a:t>GitHub Projects for Project Management</a:t>
+            </a:r>
+          </a:p>
+          <a:p>
+            <a:pPr lvl="1"/>
+            <a:r>
+              <a:rPr lang="en-US" dirty="0"/>
+              <a:t>GitHub Actions / Netlify for CI/CD</a:t>
+            </a:r>
+          </a:p>
+          <a:p>
+            <a:pPr lvl="1"/>
+            <a:r>
+              <a:rPr lang="en-US" dirty="0"/>
+              <a:t>Also, other miscellaneous tools</a:t>
             </a:r>
           </a:p>
           <a:p>
@@ -8877,15 +8971,7 @@
           <a:p>
             <a:r>
               <a:rPr lang="en-US" dirty="0"/>
-              <a:t>We will start with an individual project, divided into 2 </a:t>
-            </a:r>
-            <a:r>
-              <a:rPr lang="en-US" dirty="0" err="1"/>
-              <a:t>homeworks</a:t>
-            </a:r>
-            <a:r>
-              <a:rPr lang="en-US" dirty="0"/>
-              <a:t>.  This is to be done individually</a:t>
+              <a:t>We will start with an individual project, divided into 2 deliverables.  This is to be done individually</a:t>
             </a:r>
           </a:p>
           <a:p>
@@ -8931,7 +9017,7 @@
             <a:pPr lvl="1"/>
             <a:r>
               <a:rPr lang="en-US" dirty="0"/>
-              <a:t>20% Exam (Week 9)</a:t>
+              <a:t>20% Exam</a:t>
             </a:r>
           </a:p>
         </p:txBody>
@@ -9064,7 +9150,7 @@
           <a:p>
             <a:r>
               <a:rPr lang="en-US" dirty="0"/>
-              <a:t>Individual projects will help you become familiar with codebase.</a:t>
+              <a:t>Individual projects will help you become familiar with the codebase.</a:t>
             </a:r>
           </a:p>
           <a:p>
@@ -9388,7 +9474,7 @@
                   <a:srgbClr val="FF0000"/>
                 </a:solidFill>
               </a:rPr>
-              <a:t>Peer evaluations will be utilized, and Individual contribution WILL impact your project grade.</a:t>
+              <a:t>Peer evaluations will be utilized, and Individual contributions WILL impact your project grade.</a:t>
             </a:r>
           </a:p>
         </p:txBody>
@@ -9491,7 +9577,26 @@
             <a:pPr lvl="1"/>
             <a:r>
               <a:rPr lang="en-US" dirty="0"/>
-              <a:t>We will provide a dedicated portal for regrade requests. </a:t>
+              <a:t>All regrade requests must be made through </a:t>
+            </a:r>
+            <a:r>
+              <a:rPr lang="en-US" dirty="0" err="1"/>
+              <a:t>Gradescope</a:t>
+            </a:r>
+            <a:r>
+              <a:rPr lang="en-US" dirty="0"/>
+              <a:t>.</a:t>
+            </a:r>
+          </a:p>
+          <a:p>
+            <a:pPr lvl="2"/>
+            <a:r>
+              <a:rPr lang="en-US" dirty="0" err="1"/>
+              <a:t>GradeScope</a:t>
+            </a:r>
+            <a:r>
+              <a:rPr lang="en-US" dirty="0"/>
+              <a:t> provides an interface that allows us to review all regrade requests in one place. </a:t>
             </a:r>
           </a:p>
           <a:p>
@@ -9517,7 +9622,7 @@
             <a:pPr lvl="1"/>
             <a:r>
               <a:rPr lang="en-US" dirty="0"/>
-              <a:t>All regrade requests must be submitted within 7 days from your receipt of the graded work.</a:t>
+              <a:t>All regrade requests must be submitted within 7 days from your receipt of the graded work. </a:t>
             </a:r>
           </a:p>
           <a:p>
@@ -9622,10 +9727,15 @@
             <p:ph idx="1"/>
           </p:nvPr>
         </p:nvSpPr>
-        <p:spPr/>
+        <p:spPr>
+          <a:xfrm>
+            <a:off x="838200" y="1500160"/>
+            <a:ext cx="8662639" cy="4856190"/>
+          </a:xfrm>
+        </p:spPr>
         <p:txBody>
           <a:bodyPr>
-            <a:normAutofit lnSpcReduction="10000"/>
+            <a:normAutofit/>
           </a:bodyPr>
           <a:lstStyle/>
           <a:p>
@@ -9646,14 +9756,14 @@
             <a:pPr lvl="1"/>
             <a:r>
               <a:rPr lang="en-US" dirty="0"/>
-              <a:t>10% will be deducted for late HW assignments turned in within 24 hours after the due date </a:t>
+              <a:t>10% will be deducted for late HW (individual assignments) turned in within 24 hours after the due date </a:t>
             </a:r>
           </a:p>
           <a:p>
             <a:pPr lvl="1"/>
             <a:r>
               <a:rPr lang="en-US" dirty="0"/>
-              <a:t>HW assignments submitted more than 24 hours late will receive a zero.</a:t>
+              <a:t>Individual assignments submitted more than 24 hours late will receive a zero.</a:t>
             </a:r>
           </a:p>
           <a:p>
@@ -9667,6 +9777,17 @@
             <a:pPr lvl="1"/>
             <a:r>
               <a:rPr lang="en-US" dirty="0"/>
+              <a:t>No late submissions allowed for any </a:t>
+            </a:r>
+            <a:r>
+              <a:rPr lang="en-US" b="1" dirty="0"/>
+              <a:t>group work</a:t>
+            </a:r>
+          </a:p>
+          <a:p>
+            <a:pPr lvl="1"/>
+            <a:r>
+              <a:rPr lang="en-US" dirty="0"/>
               <a:t>If you have an accommodation from Disability Services, you must request it from the instructors separately for each assignment or exam.</a:t>
             </a:r>
           </a:p>
@@ -9674,7 +9795,7 @@
             <a:pPr lvl="2"/>
             <a:r>
               <a:rPr lang="en-US" dirty="0"/>
-              <a:t>DSS Accommodations for group assignments</a:t>
+              <a:t>DSS Accommodations are usually NOT available for Group Assignments</a:t>
             </a:r>
           </a:p>
         </p:txBody>
@@ -10944,7 +11065,7 @@
           <a:p>
             <a:r>
               <a:rPr lang="en-US" dirty="0"/>
-              <a:t>By the end of this lesson you should be able to:</a:t>
+              <a:t>By the end of this lesson, you should be able to:</a:t>
             </a:r>
           </a:p>
           <a:p>
@@ -12209,7 +12330,7 @@
         </p:xfrm>
         <a:graphic>
           <a:graphicData uri="http://schemas.openxmlformats.org/drawingml/2006/diagram">
-            <dgm:relIds xmlns:dgm="http://schemas.openxmlformats.org/drawingml/2006/diagram" xmlns:r="http://schemas.openxmlformats.org/officeDocument/2006/relationships" r:dm="rId2" r:lo="rId3" r:qs="rId4" r:cs="rId5"/>
+            <dgm:relIds xmlns:dgm="http://schemas.openxmlformats.org/drawingml/2006/diagram" xmlns:r="http://schemas.openxmlformats.org/officeDocument/2006/relationships" r:dm="rId3" r:lo="rId4" r:qs="rId5" r:cs="rId6"/>
           </a:graphicData>
         </a:graphic>
       </p:graphicFrame>
@@ -12646,7 +12767,7 @@
           </a:ln>
           <a:extLst>
             <a:ext uri="{C572A759-6A51-4108-AA02-DFA0A04FC94B}">
-              <ma14:wrappingTextBoxFlag xmlns:ma14="http://schemas.microsoft.com/office/mac/drawingml/2011/main" xmlns:a14="http://schemas.microsoft.com/office/drawing/2010/main" xmlns:m="http://schemas.openxmlformats.org/officeDocument/2006/math" xmlns="" val="1"/>
+              <ma14:wrappingTextBoxFlag xmlns="" xmlns:m="http://schemas.openxmlformats.org/officeDocument/2006/math" xmlns:a14="http://schemas.microsoft.com/office/drawing/2010/main" xmlns:ma14="http://schemas.microsoft.com/office/mac/drawingml/2011/main" val="1"/>
             </a:ext>
           </a:extLst>
         </p:spPr>
@@ -12707,7 +12828,7 @@
           </a:ln>
           <a:extLst>
             <a:ext uri="{C572A759-6A51-4108-AA02-DFA0A04FC94B}">
-              <ma14:wrappingTextBoxFlag xmlns:ma14="http://schemas.microsoft.com/office/mac/drawingml/2011/main" xmlns:a14="http://schemas.microsoft.com/office/drawing/2010/main" xmlns:m="http://schemas.openxmlformats.org/officeDocument/2006/math" xmlns="" val="1"/>
+              <ma14:wrappingTextBoxFlag xmlns="" xmlns:m="http://schemas.openxmlformats.org/officeDocument/2006/math" xmlns:a14="http://schemas.microsoft.com/office/drawing/2010/main" xmlns:ma14="http://schemas.microsoft.com/office/mac/drawingml/2011/main" val="1"/>
             </a:ext>
           </a:extLst>
         </p:spPr>

</xml_diff>

<commit_message>
changed DSS to DRC in L1.1
</commit_message>
<xml_diff>
--- a/Slides/Lesson 1.1 Course Introduction.pptx
+++ b/Slides/Lesson 1.1 Course Introduction.pptx
@@ -136,8 +136,40 @@
 </p:presentation>
 </file>
 
+<file path=ppt/revisionInfo.xml><?xml version="1.0" encoding="utf-8"?>
+<p1510:revInfo xmlns:a="http://schemas.openxmlformats.org/drawingml/2006/main" xmlns:r="http://schemas.openxmlformats.org/officeDocument/2006/relationships" xmlns:p1510="http://schemas.microsoft.com/office/powerpoint/2015/10/main">
+  <p1510:revLst>
+    <p1510:client id="{84254308-5F2F-40C8-A19F-CD2A024C639D}" v="1" dt="2022-09-09T02:31:31.539"/>
+  </p1510:revLst>
+</p1510:revInfo>
+</file>
+
 <file path=ppt/changesInfos/changesInfo1.xml><?xml version="1.0" encoding="utf-8"?>
 <pc:chgInfo xmlns:a="http://schemas.openxmlformats.org/drawingml/2006/main" xmlns:r="http://schemas.openxmlformats.org/officeDocument/2006/relationships" xmlns:ac="http://schemas.microsoft.com/office/drawing/2013/main/command" xmlns:pc="http://schemas.microsoft.com/office/powerpoint/2013/main/command">
+  <pc:docChgLst>
+    <pc:chgData name="Mitchell Wand" userId="de9b44c55c049659" providerId="LiveId" clId="{84254308-5F2F-40C8-A19F-CD2A024C639D}"/>
+    <pc:docChg chg="modSld">
+      <pc:chgData name="Mitchell Wand" userId="de9b44c55c049659" providerId="LiveId" clId="{84254308-5F2F-40C8-A19F-CD2A024C639D}" dt="2022-09-09T02:31:53.070" v="17" actId="20577"/>
+      <pc:docMkLst>
+        <pc:docMk/>
+      </pc:docMkLst>
+      <pc:sldChg chg="modSp mod">
+        <pc:chgData name="Mitchell Wand" userId="de9b44c55c049659" providerId="LiveId" clId="{84254308-5F2F-40C8-A19F-CD2A024C639D}" dt="2022-09-09T02:31:53.070" v="17" actId="20577"/>
+        <pc:sldMkLst>
+          <pc:docMk/>
+          <pc:sldMk cId="0" sldId="280"/>
+        </pc:sldMkLst>
+        <pc:spChg chg="mod">
+          <ac:chgData name="Mitchell Wand" userId="de9b44c55c049659" providerId="LiveId" clId="{84254308-5F2F-40C8-A19F-CD2A024C639D}" dt="2022-09-09T02:31:53.070" v="17" actId="20577"/>
+          <ac:spMkLst>
+            <pc:docMk/>
+            <pc:sldMk cId="0" sldId="280"/>
+            <ac:spMk id="258" creationId="{00000000-0000-0000-0000-000000000000}"/>
+          </ac:spMkLst>
+        </pc:spChg>
+      </pc:sldChg>
+    </pc:docChg>
+  </pc:docChgLst>
   <pc:docChgLst>
     <pc:chgData name="Mitchell Wand" userId="de9b44c55c049659" providerId="LiveId" clId="{D5DCE915-3EA3-44C5-B0FC-5B0576900331}"/>
     <pc:docChg chg="custSel modSld">
@@ -3500,7 +3532,7 @@
           <a:p>
             <a:fld id="{7C7E5181-6CF5-45F7-A87A-E0E0B1FD7549}" type="datetimeFigureOut">
               <a:rPr lang="en-US" smtClean="0"/>
-              <a:t>8/31/2022</a:t>
+              <a:t>9/8/2022</a:t>
             </a:fld>
             <a:endParaRPr lang="en-US"/>
           </a:p>
@@ -4404,7 +4436,7 @@
           <a:p>
             <a:fld id="{5D2A64DE-480B-420F-9649-4F8E696E08E0}" type="datetime1">
               <a:rPr lang="en-US" smtClean="0"/>
-              <a:t>8/31/2022</a:t>
+              <a:t>9/8/2022</a:t>
             </a:fld>
             <a:endParaRPr lang="en-US"/>
           </a:p>
@@ -4638,7 +4670,7 @@
           <a:p>
             <a:fld id="{0D3616D0-8311-4107-9726-6B805E7D05BA}" type="datetime1">
               <a:rPr lang="en-US" smtClean="0"/>
-              <a:t>8/31/2022</a:t>
+              <a:t>9/8/2022</a:t>
             </a:fld>
             <a:endParaRPr lang="en-US"/>
           </a:p>
@@ -4846,7 +4878,7 @@
           <a:p>
             <a:fld id="{3BC2557A-5C88-417A-A763-5AC779462A5F}" type="datetime1">
               <a:rPr lang="en-US" smtClean="0"/>
-              <a:t>8/31/2022</a:t>
+              <a:t>9/8/2022</a:t>
             </a:fld>
             <a:endParaRPr lang="en-US"/>
           </a:p>
@@ -5370,7 +5402,7 @@
           <a:p>
             <a:fld id="{07C7BFD4-467E-4EDE-93EA-052F5B39A4E5}" type="datetime1">
               <a:rPr lang="en-US" smtClean="0"/>
-              <a:t>8/31/2022</a:t>
+              <a:t>9/8/2022</a:t>
             </a:fld>
             <a:endParaRPr lang="en-US"/>
           </a:p>
@@ -5683,7 +5715,7 @@
           <a:p>
             <a:fld id="{A533CBE2-D5BE-47AC-ADC2-9CDFC1D0CF90}" type="datetime1">
               <a:rPr lang="en-US" smtClean="0"/>
-              <a:t>8/31/2022</a:t>
+              <a:t>9/8/2022</a:t>
             </a:fld>
             <a:endParaRPr lang="en-US"/>
           </a:p>
@@ -5984,7 +6016,7 @@
           <a:p>
             <a:fld id="{39B7EDB1-CE74-4951-85A2-0B01C2128E28}" type="datetime1">
               <a:rPr lang="en-US" smtClean="0"/>
-              <a:t>8/31/2022</a:t>
+              <a:t>9/8/2022</a:t>
             </a:fld>
             <a:endParaRPr lang="en-US"/>
           </a:p>
@@ -6432,7 +6464,7 @@
           <a:p>
             <a:fld id="{2BC7EB92-A5C2-4807-A9DC-9EDE6CBFB241}" type="datetime1">
               <a:rPr lang="en-US" smtClean="0"/>
-              <a:t>8/31/2022</a:t>
+              <a:t>9/8/2022</a:t>
             </a:fld>
             <a:endParaRPr lang="en-US"/>
           </a:p>
@@ -6578,7 +6610,7 @@
           <a:p>
             <a:fld id="{109E55A0-C911-4F03-82FC-7E5926047D46}" type="datetime1">
               <a:rPr lang="en-US" smtClean="0"/>
-              <a:t>8/31/2022</a:t>
+              <a:t>9/8/2022</a:t>
             </a:fld>
             <a:endParaRPr lang="en-US"/>
           </a:p>
@@ -6727,7 +6759,7 @@
           <a:p>
             <a:fld id="{2B7B7EE0-7771-4CD5-9B2B-3550753A54A1}" type="datetime1">
               <a:rPr lang="en-US" smtClean="0"/>
-              <a:t>8/31/2022</a:t>
+              <a:t>9/8/2022</a:t>
             </a:fld>
             <a:endParaRPr lang="en-US"/>
           </a:p>
@@ -7038,7 +7070,7 @@
           <a:p>
             <a:fld id="{F8B318B3-0E87-4416-A9B8-D891968C2727}" type="datetime1">
               <a:rPr lang="en-US" smtClean="0"/>
-              <a:t>8/31/2022</a:t>
+              <a:t>9/8/2022</a:t>
             </a:fld>
             <a:endParaRPr lang="en-US"/>
           </a:p>
@@ -7326,7 +7358,7 @@
           <a:p>
             <a:fld id="{EA476A42-A091-4468-A075-64A31BE59948}" type="datetime1">
               <a:rPr lang="en-US" smtClean="0"/>
-              <a:t>8/31/2022</a:t>
+              <a:t>9/8/2022</a:t>
             </a:fld>
             <a:endParaRPr lang="en-US"/>
           </a:p>
@@ -7567,7 +7599,7 @@
           <a:p>
             <a:fld id="{54D997E8-DDEE-43F1-8D9B-F8A1E11DE488}" type="datetime1">
               <a:rPr lang="en-US" smtClean="0"/>
-              <a:t>8/31/2022</a:t>
+              <a:t>9/8/2022</a:t>
             </a:fld>
             <a:endParaRPr lang="en-US"/>
           </a:p>
@@ -9788,14 +9820,22 @@
             <a:pPr lvl="1"/>
             <a:r>
               <a:rPr lang="en-US" dirty="0"/>
-              <a:t>If you have an accommodation from Disability Services, you must request it from the instructors separately for each assignment or exam.</a:t>
+              <a:t>If you have an accommodation from Disability </a:t>
+            </a:r>
+            <a:r>
+              <a:rPr lang="en-US"/>
+              <a:t>Resource Center, </a:t>
+            </a:r>
+            <a:r>
+              <a:rPr lang="en-US" dirty="0"/>
+              <a:t>you must request it from the instructors separately for each assignment or exam.</a:t>
             </a:r>
           </a:p>
           <a:p>
             <a:pPr lvl="2"/>
             <a:r>
               <a:rPr lang="en-US" dirty="0"/>
-              <a:t>DSS Accommodations are usually NOT available for Group Assignments</a:t>
+              <a:t>DRC Accommodations are usually NOT available for Group Assignments</a:t>
             </a:r>
           </a:p>
         </p:txBody>
@@ -12767,7 +12807,7 @@
           </a:ln>
           <a:extLst>
             <a:ext uri="{C572A759-6A51-4108-AA02-DFA0A04FC94B}">
-              <ma14:wrappingTextBoxFlag xmlns="" xmlns:m="http://schemas.openxmlformats.org/officeDocument/2006/math" xmlns:a14="http://schemas.microsoft.com/office/drawing/2010/main" xmlns:ma14="http://schemas.microsoft.com/office/mac/drawingml/2011/main" val="1"/>
+              <ma14:wrappingTextBoxFlag xmlns:ma14="http://schemas.microsoft.com/office/mac/drawingml/2011/main" xmlns:a14="http://schemas.microsoft.com/office/drawing/2010/main" xmlns:m="http://schemas.openxmlformats.org/officeDocument/2006/math" xmlns="" val="1"/>
             </a:ext>
           </a:extLst>
         </p:spPr>
@@ -12828,7 +12868,7 @@
           </a:ln>
           <a:extLst>
             <a:ext uri="{C572A759-6A51-4108-AA02-DFA0A04FC94B}">
-              <ma14:wrappingTextBoxFlag xmlns="" xmlns:m="http://schemas.openxmlformats.org/officeDocument/2006/math" xmlns:a14="http://schemas.microsoft.com/office/drawing/2010/main" xmlns:ma14="http://schemas.microsoft.com/office/mac/drawingml/2011/main" val="1"/>
+              <ma14:wrappingTextBoxFlag xmlns:ma14="http://schemas.microsoft.com/office/mac/drawingml/2011/main" xmlns:a14="http://schemas.microsoft.com/office/drawing/2010/main" xmlns:m="http://schemas.openxmlformats.org/officeDocument/2006/math" xmlns="" val="1"/>
             </a:ext>
           </a:extLst>
         </p:spPr>

</xml_diff>